<commit_message>
uploading datasheeds first time and ading ingo to the pwp guide project
</commit_message>
<xml_diff>
--- a/Motorbike inclination.pptx
+++ b/Motorbike inclination.pptx
@@ -4333,8 +4333,13 @@
           <a:p>
             <a:r>
               <a:rPr lang="en-US" dirty="0"/>
-              <a:t>Quick description</a:t>
-            </a:r>
+              <a:t>IMU </a:t>
+            </a:r>
+            <a:r>
+              <a:rPr lang="en-US" sz="2800" dirty="0"/>
+              <a:t>MPU6050</a:t>
+            </a:r>
+            <a:endParaRPr lang="en-US" dirty="0"/>
           </a:p>
         </p:txBody>
       </p:sp>
@@ -4368,6 +4373,222 @@
           </a:prstGeom>
         </p:spPr>
       </p:pic>
+      <p:pic>
+        <p:nvPicPr>
+          <p:cNvPr id="5" name="Imagen 4">
+            <a:extLst>
+              <a:ext uri="{FF2B5EF4-FFF2-40B4-BE49-F238E27FC236}">
+                <a16:creationId xmlns:a16="http://schemas.microsoft.com/office/drawing/2014/main" id="{00EA61B5-EC84-CB9B-6236-8753430F2310}"/>
+              </a:ext>
+            </a:extLst>
+          </p:cNvPr>
+          <p:cNvPicPr>
+            <a:picLocks noChangeAspect="1"/>
+          </p:cNvPicPr>
+          <p:nvPr/>
+        </p:nvPicPr>
+        <p:blipFill>
+          <a:blip r:embed="rId3"/>
+          <a:stretch>
+            <a:fillRect/>
+          </a:stretch>
+        </p:blipFill>
+        <p:spPr>
+          <a:xfrm>
+            <a:off x="1399145" y="2148256"/>
+            <a:ext cx="2066546" cy="1708653"/>
+          </a:xfrm>
+          <a:prstGeom prst="rect">
+            <a:avLst/>
+          </a:prstGeom>
+        </p:spPr>
+      </p:pic>
+      <p:sp>
+        <p:nvSpPr>
+          <p:cNvPr id="6" name="CuadroTexto 5">
+            <a:extLst>
+              <a:ext uri="{FF2B5EF4-FFF2-40B4-BE49-F238E27FC236}">
+                <a16:creationId xmlns:a16="http://schemas.microsoft.com/office/drawing/2014/main" id="{2E487B7D-8F10-05BC-E5F9-080DEC9EB090}"/>
+              </a:ext>
+            </a:extLst>
+          </p:cNvPr>
+          <p:cNvSpPr txBox="1"/>
+          <p:nvPr/>
+        </p:nvSpPr>
+        <p:spPr>
+          <a:xfrm>
+            <a:off x="7927340" y="1686591"/>
+            <a:ext cx="1250527" cy="461665"/>
+          </a:xfrm>
+          <a:prstGeom prst="rect">
+            <a:avLst/>
+          </a:prstGeom>
+          <a:noFill/>
+        </p:spPr>
+        <p:txBody>
+          <a:bodyPr wrap="square" rtlCol="0">
+            <a:spAutoFit/>
+          </a:bodyPr>
+          <a:lstStyle/>
+          <a:p>
+            <a:r>
+              <a:rPr lang="es-ES" sz="2400" b="1" dirty="0" err="1"/>
+              <a:t>PinOut</a:t>
+            </a:r>
+            <a:endParaRPr lang="en-US" sz="2400" b="1" dirty="0"/>
+          </a:p>
+        </p:txBody>
+      </p:sp>
+      <p:sp>
+        <p:nvSpPr>
+          <p:cNvPr id="7" name="CuadroTexto 6">
+            <a:extLst>
+              <a:ext uri="{FF2B5EF4-FFF2-40B4-BE49-F238E27FC236}">
+                <a16:creationId xmlns:a16="http://schemas.microsoft.com/office/drawing/2014/main" id="{61CFA16C-8602-9DCE-CE4B-B3223A165516}"/>
+              </a:ext>
+            </a:extLst>
+          </p:cNvPr>
+          <p:cNvSpPr txBox="1"/>
+          <p:nvPr/>
+        </p:nvSpPr>
+        <p:spPr>
+          <a:xfrm>
+            <a:off x="411480" y="4110439"/>
+            <a:ext cx="5323276" cy="923330"/>
+          </a:xfrm>
+          <a:prstGeom prst="rect">
+            <a:avLst/>
+          </a:prstGeom>
+          <a:noFill/>
+        </p:spPr>
+        <p:txBody>
+          <a:bodyPr wrap="square" rtlCol="0">
+            <a:spAutoFit/>
+          </a:bodyPr>
+          <a:lstStyle/>
+          <a:p>
+            <a:pPr marL="285750" indent="-285750">
+              <a:buFontTx/>
+              <a:buChar char="-"/>
+            </a:pPr>
+            <a:r>
+              <a:rPr lang="en-US" dirty="0"/>
+              <a:t>This sensor contains an accelerometer and a gyroscope</a:t>
+            </a:r>
+          </a:p>
+          <a:p>
+            <a:pPr marL="285750" indent="-285750">
+              <a:buFontTx/>
+              <a:buChar char="-"/>
+            </a:pPr>
+            <a:r>
+              <a:rPr lang="en-US" dirty="0"/>
+              <a:t>Communication whit the module is through I2C</a:t>
+            </a:r>
+          </a:p>
+        </p:txBody>
+      </p:sp>
+      <p:sp>
+        <p:nvSpPr>
+          <p:cNvPr id="9" name="CuadroTexto 8">
+            <a:extLst>
+              <a:ext uri="{FF2B5EF4-FFF2-40B4-BE49-F238E27FC236}">
+                <a16:creationId xmlns:a16="http://schemas.microsoft.com/office/drawing/2014/main" id="{539B0445-AA3E-93BD-F631-595CCC0371C0}"/>
+              </a:ext>
+            </a:extLst>
+          </p:cNvPr>
+          <p:cNvSpPr txBox="1"/>
+          <p:nvPr/>
+        </p:nvSpPr>
+        <p:spPr>
+          <a:xfrm>
+            <a:off x="5888425" y="2190589"/>
+            <a:ext cx="5328356" cy="2585323"/>
+          </a:xfrm>
+          <a:prstGeom prst="rect">
+            <a:avLst/>
+          </a:prstGeom>
+          <a:noFill/>
+        </p:spPr>
+        <p:txBody>
+          <a:bodyPr wrap="square" rtlCol="0">
+            <a:spAutoFit/>
+          </a:bodyPr>
+          <a:lstStyle/>
+          <a:p>
+            <a:r>
+              <a:rPr lang="es-ES" dirty="0"/>
+              <a:t>VCC - </a:t>
+            </a:r>
+            <a:r>
+              <a:rPr lang="es-ES" dirty="0" err="1"/>
+              <a:t>Power</a:t>
+            </a:r>
+            <a:r>
+              <a:rPr lang="es-ES" dirty="0"/>
+              <a:t> </a:t>
+            </a:r>
+            <a:r>
+              <a:rPr lang="es-ES" dirty="0" err="1"/>
+              <a:t>the</a:t>
+            </a:r>
+            <a:r>
+              <a:rPr lang="es-ES" dirty="0"/>
+              <a:t> sensor 3.3V</a:t>
+            </a:r>
+          </a:p>
+          <a:p>
+            <a:r>
+              <a:rPr lang="en-US" dirty="0"/>
+              <a:t>GND </a:t>
+            </a:r>
+          </a:p>
+          <a:p>
+            <a:r>
+              <a:rPr lang="en-US" dirty="0"/>
+              <a:t>SCL – </a:t>
+            </a:r>
+            <a:r>
+              <a:rPr lang="en-US" dirty="0" err="1"/>
+              <a:t>clk</a:t>
+            </a:r>
+            <a:r>
+              <a:rPr lang="en-US" dirty="0"/>
+              <a:t> for I2C</a:t>
+            </a:r>
+          </a:p>
+          <a:p>
+            <a:r>
+              <a:rPr lang="en-US" dirty="0"/>
+              <a:t>SDA – Data line for I2C</a:t>
+            </a:r>
+          </a:p>
+          <a:p>
+            <a:r>
+              <a:rPr lang="en-US" dirty="0"/>
+              <a:t>XDA – Used to interface other I2C with the MPU6050</a:t>
+            </a:r>
+          </a:p>
+          <a:p>
+            <a:r>
+              <a:rPr lang="en-US" dirty="0"/>
+              <a:t>XCL – Used to interface other I2C with the MPU6050</a:t>
+            </a:r>
+          </a:p>
+          <a:p>
+            <a:r>
+              <a:rPr lang="en-US" dirty="0"/>
+              <a:t>AD0 – Use this pin to change the I2C address</a:t>
+            </a:r>
+          </a:p>
+          <a:p>
+            <a:r>
+              <a:rPr lang="en-US" dirty="0"/>
+              <a:t>INT – Interrupt pin , can be used to indicate that new measurement data is available</a:t>
+            </a:r>
+          </a:p>
+        </p:txBody>
+      </p:sp>
     </p:spTree>
     <p:extLst>
       <p:ext uri="{BB962C8B-B14F-4D97-AF65-F5344CB8AC3E}">

</xml_diff>

<commit_message>
pdf shematic of ESP32 DB
</commit_message>
<xml_diff>
--- a/Motorbike inclination.pptx
+++ b/Motorbike inclination.pptx
@@ -10,6 +10,7 @@
     <p:sldId id="258" r:id="rId4"/>
     <p:sldId id="259" r:id="rId5"/>
     <p:sldId id="260" r:id="rId6"/>
+    <p:sldId id="261" r:id="rId7"/>
   </p:sldIdLst>
   <p:sldSz cx="12192000" cy="6858000"/>
   <p:notesSz cx="6858000" cy="9144000"/>
@@ -4081,7 +4082,7 @@
           <a:p>
             <a:r>
               <a:rPr lang="en-US" dirty="0"/>
-              <a:t>ESP32 - DB</a:t>
+              <a:t>ESP32-WROOM-32S</a:t>
             </a:r>
           </a:p>
         </p:txBody>
@@ -4593,6 +4594,198 @@
     <p:extLst>
       <p:ext uri="{BB962C8B-B14F-4D97-AF65-F5344CB8AC3E}">
         <p14:creationId xmlns:p14="http://schemas.microsoft.com/office/powerpoint/2010/main" val="1206351033"/>
+      </p:ext>
+    </p:extLst>
+  </p:cSld>
+  <p:clrMapOvr>
+    <a:masterClrMapping/>
+  </p:clrMapOvr>
+</p:sld>
+</file>
+
+<file path=ppt/slides/slide6.xml><?xml version="1.0" encoding="utf-8"?>
+<p:sld xmlns:a="http://schemas.openxmlformats.org/drawingml/2006/main" xmlns:r="http://schemas.openxmlformats.org/officeDocument/2006/relationships" xmlns:p="http://schemas.openxmlformats.org/presentationml/2006/main">
+  <p:cSld>
+    <p:spTree>
+      <p:nvGrpSpPr>
+        <p:cNvPr id="1" name=""/>
+        <p:cNvGrpSpPr/>
+        <p:nvPr/>
+      </p:nvGrpSpPr>
+      <p:grpSpPr>
+        <a:xfrm>
+          <a:off x="0" y="0"/>
+          <a:ext cx="0" cy="0"/>
+          <a:chOff x="0" y="0"/>
+          <a:chExt cx="0" cy="0"/>
+        </a:xfrm>
+      </p:grpSpPr>
+      <p:sp>
+        <p:nvSpPr>
+          <p:cNvPr id="4" name="Rectángulo 3">
+            <a:extLst>
+              <a:ext uri="{FF2B5EF4-FFF2-40B4-BE49-F238E27FC236}">
+                <a16:creationId xmlns:a16="http://schemas.microsoft.com/office/drawing/2014/main" id="{2EA479E0-542A-8C82-B506-B531D8FC74AA}"/>
+              </a:ext>
+            </a:extLst>
+          </p:cNvPr>
+          <p:cNvSpPr/>
+          <p:nvPr/>
+        </p:nvSpPr>
+        <p:spPr>
+          <a:xfrm>
+            <a:off x="0" y="0"/>
+            <a:ext cx="10678292" cy="1325563"/>
+          </a:xfrm>
+          <a:prstGeom prst="rect">
+            <a:avLst/>
+          </a:prstGeom>
+          <a:gradFill flip="none" rotWithShape="1">
+            <a:gsLst>
+              <a:gs pos="54000">
+                <a:schemeClr val="accent2">
+                  <a:lumMod val="60000"/>
+                  <a:lumOff val="40000"/>
+                </a:schemeClr>
+              </a:gs>
+              <a:gs pos="96000">
+                <a:schemeClr val="bg1"/>
+              </a:gs>
+              <a:gs pos="0">
+                <a:schemeClr val="accent2">
+                  <a:lumMod val="75000"/>
+                </a:schemeClr>
+              </a:gs>
+            </a:gsLst>
+            <a:lin ang="0" scaled="1"/>
+            <a:tileRect/>
+          </a:gradFill>
+          <a:ln>
+            <a:noFill/>
+          </a:ln>
+        </p:spPr>
+        <p:style>
+          <a:lnRef idx="2">
+            <a:schemeClr val="accent1">
+              <a:shade val="15000"/>
+            </a:schemeClr>
+          </a:lnRef>
+          <a:fillRef idx="1">
+            <a:schemeClr val="accent1"/>
+          </a:fillRef>
+          <a:effectRef idx="0">
+            <a:schemeClr val="accent1"/>
+          </a:effectRef>
+          <a:fontRef idx="minor">
+            <a:schemeClr val="lt1"/>
+          </a:fontRef>
+        </p:style>
+        <p:txBody>
+          <a:bodyPr rtlCol="0" anchor="ctr"/>
+          <a:lstStyle/>
+          <a:p>
+            <a:pPr algn="ctr"/>
+            <a:endParaRPr lang="en-US"/>
+          </a:p>
+        </p:txBody>
+      </p:sp>
+      <p:sp>
+        <p:nvSpPr>
+          <p:cNvPr id="2" name="Título 1">
+            <a:extLst>
+              <a:ext uri="{FF2B5EF4-FFF2-40B4-BE49-F238E27FC236}">
+                <a16:creationId xmlns:a16="http://schemas.microsoft.com/office/drawing/2014/main" id="{ED07CD16-78BA-B6C8-A962-F79236BF8654}"/>
+              </a:ext>
+            </a:extLst>
+          </p:cNvPr>
+          <p:cNvSpPr>
+            <a:spLocks noGrp="1"/>
+          </p:cNvSpPr>
+          <p:nvPr>
+            <p:ph type="title"/>
+          </p:nvPr>
+        </p:nvSpPr>
+        <p:spPr>
+          <a:xfrm>
+            <a:off x="411480" y="136525"/>
+            <a:ext cx="6903720" cy="937108"/>
+          </a:xfrm>
+        </p:spPr>
+        <p:txBody>
+          <a:bodyPr/>
+          <a:lstStyle/>
+          <a:p>
+            <a:r>
+              <a:rPr lang="en-US" dirty="0"/>
+              <a:t>Connections</a:t>
+            </a:r>
+          </a:p>
+        </p:txBody>
+      </p:sp>
+      <p:pic>
+        <p:nvPicPr>
+          <p:cNvPr id="8" name="Imagen 7">
+            <a:extLst>
+              <a:ext uri="{FF2B5EF4-FFF2-40B4-BE49-F238E27FC236}">
+                <a16:creationId xmlns:a16="http://schemas.microsoft.com/office/drawing/2014/main" id="{F37DC3E1-31D0-7D74-97BE-482847DA22F9}"/>
+              </a:ext>
+            </a:extLst>
+          </p:cNvPr>
+          <p:cNvPicPr>
+            <a:picLocks noChangeAspect="1"/>
+          </p:cNvPicPr>
+          <p:nvPr/>
+        </p:nvPicPr>
+        <p:blipFill>
+          <a:blip r:embed="rId2"/>
+          <a:stretch>
+            <a:fillRect/>
+          </a:stretch>
+        </p:blipFill>
+        <p:spPr>
+          <a:xfrm>
+            <a:off x="10899272" y="297648"/>
+            <a:ext cx="881248" cy="730265"/>
+          </a:xfrm>
+          <a:prstGeom prst="rect">
+            <a:avLst/>
+          </a:prstGeom>
+        </p:spPr>
+      </p:pic>
+      <p:pic>
+        <p:nvPicPr>
+          <p:cNvPr id="10" name="Imagen 9">
+            <a:extLst>
+              <a:ext uri="{FF2B5EF4-FFF2-40B4-BE49-F238E27FC236}">
+                <a16:creationId xmlns:a16="http://schemas.microsoft.com/office/drawing/2014/main" id="{E92EF464-8E39-498C-2450-F0E7DE7B835D}"/>
+              </a:ext>
+            </a:extLst>
+          </p:cNvPr>
+          <p:cNvPicPr>
+            <a:picLocks noChangeAspect="1"/>
+          </p:cNvPicPr>
+          <p:nvPr/>
+        </p:nvPicPr>
+        <p:blipFill>
+          <a:blip r:embed="rId3"/>
+          <a:stretch>
+            <a:fillRect/>
+          </a:stretch>
+        </p:blipFill>
+        <p:spPr>
+          <a:xfrm>
+            <a:off x="5031587" y="2144888"/>
+            <a:ext cx="3908595" cy="4430889"/>
+          </a:xfrm>
+          <a:prstGeom prst="rect">
+            <a:avLst/>
+          </a:prstGeom>
+        </p:spPr>
+      </p:pic>
+    </p:spTree>
+    <p:extLst>
+      <p:ext uri="{BB962C8B-B14F-4D97-AF65-F5344CB8AC3E}">
+        <p14:creationId xmlns:p14="http://schemas.microsoft.com/office/powerpoint/2010/main" val="2127166567"/>
       </p:ext>
     </p:extLst>
   </p:cSld>

</xml_diff>